<commit_message>
Made some edits to the Developer guide, as well as updated some of the diagrams.
The changes are made according to the specifications we agreed on.
</commit_message>
<xml_diff>
--- a/docs/diagrams/ModelComponentClassBetterOopDiagram.pptx
+++ b/docs/diagrams/ModelComponentClassBetterOopDiagram.pptx
@@ -208,7 +208,7 @@
           <a:p>
             <a:fld id="{F5CC4B3F-88C1-4FFA-B1B6-F41C21DC6924}" type="datetimeFigureOut">
               <a:rPr lang="en-US" smtClean="0"/>
-              <a:t>6/27/2018</a:t>
+              <a:t>9/18/18</a:t>
             </a:fld>
             <a:endParaRPr lang="en-US"/>
           </a:p>
@@ -654,7 +654,7 @@
           <a:p>
             <a:fld id="{78C97017-6FC3-485B-9764-EAC9E56C1D49}" type="datetimeFigureOut">
               <a:rPr lang="en-US" smtClean="0"/>
-              <a:t>6/27/2018</a:t>
+              <a:t>9/18/18</a:t>
             </a:fld>
             <a:endParaRPr lang="en-US"/>
           </a:p>
@@ -822,7 +822,7 @@
           <a:p>
             <a:fld id="{78C97017-6FC3-485B-9764-EAC9E56C1D49}" type="datetimeFigureOut">
               <a:rPr lang="en-US" smtClean="0"/>
-              <a:t>6/27/2018</a:t>
+              <a:t>9/18/18</a:t>
             </a:fld>
             <a:endParaRPr lang="en-US"/>
           </a:p>
@@ -1000,7 +1000,7 @@
           <a:p>
             <a:fld id="{78C97017-6FC3-485B-9764-EAC9E56C1D49}" type="datetimeFigureOut">
               <a:rPr lang="en-US" smtClean="0"/>
-              <a:t>6/27/2018</a:t>
+              <a:t>9/18/18</a:t>
             </a:fld>
             <a:endParaRPr lang="en-US"/>
           </a:p>
@@ -1168,7 +1168,7 @@
           <a:p>
             <a:fld id="{78C97017-6FC3-485B-9764-EAC9E56C1D49}" type="datetimeFigureOut">
               <a:rPr lang="en-US" smtClean="0"/>
-              <a:t>6/27/2018</a:t>
+              <a:t>9/18/18</a:t>
             </a:fld>
             <a:endParaRPr lang="en-US"/>
           </a:p>
@@ -1413,7 +1413,7 @@
           <a:p>
             <a:fld id="{78C97017-6FC3-485B-9764-EAC9E56C1D49}" type="datetimeFigureOut">
               <a:rPr lang="en-US" smtClean="0"/>
-              <a:t>6/27/2018</a:t>
+              <a:t>9/18/18</a:t>
             </a:fld>
             <a:endParaRPr lang="en-US"/>
           </a:p>
@@ -1698,7 +1698,7 @@
           <a:p>
             <a:fld id="{78C97017-6FC3-485B-9764-EAC9E56C1D49}" type="datetimeFigureOut">
               <a:rPr lang="en-US" smtClean="0"/>
-              <a:t>6/27/2018</a:t>
+              <a:t>9/18/18</a:t>
             </a:fld>
             <a:endParaRPr lang="en-US"/>
           </a:p>
@@ -2117,7 +2117,7 @@
           <a:p>
             <a:fld id="{78C97017-6FC3-485B-9764-EAC9E56C1D49}" type="datetimeFigureOut">
               <a:rPr lang="en-US" smtClean="0"/>
-              <a:t>6/27/2018</a:t>
+              <a:t>9/18/18</a:t>
             </a:fld>
             <a:endParaRPr lang="en-US"/>
           </a:p>
@@ -2234,7 +2234,7 @@
           <a:p>
             <a:fld id="{78C97017-6FC3-485B-9764-EAC9E56C1D49}" type="datetimeFigureOut">
               <a:rPr lang="en-US" smtClean="0"/>
-              <a:t>6/27/2018</a:t>
+              <a:t>9/18/18</a:t>
             </a:fld>
             <a:endParaRPr lang="en-US"/>
           </a:p>
@@ -2329,7 +2329,7 @@
           <a:p>
             <a:fld id="{78C97017-6FC3-485B-9764-EAC9E56C1D49}" type="datetimeFigureOut">
               <a:rPr lang="en-US" smtClean="0"/>
-              <a:t>6/27/2018</a:t>
+              <a:t>9/18/18</a:t>
             </a:fld>
             <a:endParaRPr lang="en-US"/>
           </a:p>
@@ -2604,7 +2604,7 @@
           <a:p>
             <a:fld id="{78C97017-6FC3-485B-9764-EAC9E56C1D49}" type="datetimeFigureOut">
               <a:rPr lang="en-US" smtClean="0"/>
-              <a:t>6/27/2018</a:t>
+              <a:t>9/18/18</a:t>
             </a:fld>
             <a:endParaRPr lang="en-US"/>
           </a:p>
@@ -2856,7 +2856,7 @@
           <a:p>
             <a:fld id="{78C97017-6FC3-485B-9764-EAC9E56C1D49}" type="datetimeFigureOut">
               <a:rPr lang="en-US" smtClean="0"/>
-              <a:t>6/27/2018</a:t>
+              <a:t>9/18/18</a:t>
             </a:fld>
             <a:endParaRPr lang="en-US"/>
           </a:p>
@@ -3067,7 +3067,7 @@
           <a:p>
             <a:fld id="{78C97017-6FC3-485B-9764-EAC9E56C1D49}" type="datetimeFigureOut">
               <a:rPr lang="en-US" smtClean="0"/>
-              <a:t>6/27/2018</a:t>
+              <a:t>9/18/18</a:t>
             </a:fld>
             <a:endParaRPr lang="en-US"/>
           </a:p>
@@ -3992,7 +3992,7 @@
           <a:p>
             <a:pPr algn="ctr"/>
             <a:r>
-              <a:rPr lang="en-US" sz="1050" dirty="0" err="1" smtClean="0">
+              <a:rPr lang="en-US" sz="1050" dirty="0" err="1">
                 <a:solidFill>
                   <a:srgbClr val="7030A0"/>
                 </a:solidFill>
@@ -4388,7 +4388,7 @@
         </p:nvSpPr>
         <p:spPr>
           <a:xfrm>
-            <a:off x="7712397" y="2564238"/>
+            <a:off x="7712313" y="2257626"/>
             <a:ext cx="708186" cy="285783"/>
           </a:xfrm>
           <a:prstGeom prst="rect">
@@ -4483,46 +4483,6 @@
           </a:p>
         </p:txBody>
       </p:sp>
-      <p:cxnSp>
-        <p:nvCxnSpPr>
-          <p:cNvPr id="79" name="Elbow Connector 78"/>
-          <p:cNvCxnSpPr>
-            <a:cxnSpLocks/>
-          </p:cNvCxnSpPr>
-          <p:nvPr/>
-        </p:nvCxnSpPr>
-        <p:spPr>
-          <a:xfrm flipV="1">
-            <a:off x="7277995" y="2706821"/>
-            <a:ext cx="434402" cy="327761"/>
-          </a:xfrm>
-          <a:prstGeom prst="bentConnector3">
-            <a:avLst/>
-          </a:prstGeom>
-          <a:ln w="19050">
-            <a:solidFill>
-              <a:srgbClr val="7030A0"/>
-            </a:solidFill>
-            <a:headEnd type="none" w="med" len="med"/>
-            <a:tailEnd type="arrow" w="med" len="med"/>
-          </a:ln>
-          <a:effectLst/>
-        </p:spPr>
-        <p:style>
-          <a:lnRef idx="1">
-            <a:schemeClr val="accent2"/>
-          </a:lnRef>
-          <a:fillRef idx="2">
-            <a:schemeClr val="accent2"/>
-          </a:fillRef>
-          <a:effectRef idx="1">
-            <a:schemeClr val="accent2"/>
-          </a:effectRef>
-          <a:fontRef idx="minor">
-            <a:schemeClr val="dk1"/>
-          </a:fontRef>
-        </p:style>
-      </p:cxnSp>
       <p:sp>
         <p:nvSpPr>
           <p:cNvPr id="80" name="Rectangle 8"/>
@@ -4531,7 +4491,7 @@
         </p:nvSpPr>
         <p:spPr>
           <a:xfrm>
-            <a:off x="7712397" y="2887216"/>
+            <a:off x="7712313" y="2580604"/>
             <a:ext cx="708186" cy="285783"/>
           </a:xfrm>
           <a:prstGeom prst="rect">
@@ -4583,6 +4543,7 @@
         <p:nvCxnSpPr>
           <p:cNvPr id="81" name="Elbow Connector 80"/>
           <p:cNvCxnSpPr>
+            <a:cxnSpLocks/>
             <a:stCxn id="78" idx="3"/>
             <a:endCxn id="80" idx="1"/>
           </p:cNvCxnSpPr>
@@ -4590,8 +4551,8 @@
         </p:nvCxnSpPr>
         <p:spPr>
           <a:xfrm flipV="1">
-            <a:off x="7277995" y="3030108"/>
-            <a:ext cx="434402" cy="4783"/>
+            <a:off x="7277995" y="2723496"/>
+            <a:ext cx="434318" cy="311395"/>
           </a:xfrm>
           <a:prstGeom prst="bentConnector3">
             <a:avLst/>
@@ -4628,7 +4589,7 @@
         </p:nvSpPr>
         <p:spPr>
           <a:xfrm>
-            <a:off x="7712397" y="3210194"/>
+            <a:off x="7712313" y="2903582"/>
             <a:ext cx="708186" cy="285783"/>
           </a:xfrm>
           <a:prstGeom prst="rect">
@@ -4680,6 +4641,7 @@
         <p:nvCxnSpPr>
           <p:cNvPr id="84" name="Elbow Connector 83"/>
           <p:cNvCxnSpPr>
+            <a:cxnSpLocks/>
             <a:stCxn id="78" idx="3"/>
             <a:endCxn id="83" idx="1"/>
           </p:cNvCxnSpPr>
@@ -4688,7 +4650,7 @@
         <p:spPr>
           <a:xfrm>
             <a:off x="7277995" y="3034891"/>
-            <a:ext cx="434402" cy="318195"/>
+            <a:ext cx="434318" cy="11583"/>
           </a:xfrm>
           <a:prstGeom prst="bentConnector3">
             <a:avLst/>
@@ -4725,7 +4687,7 @@
         </p:nvSpPr>
         <p:spPr>
           <a:xfrm>
-            <a:off x="7712397" y="3533171"/>
+            <a:off x="7712313" y="3226559"/>
             <a:ext cx="708186" cy="285783"/>
           </a:xfrm>
           <a:prstGeom prst="rect">
@@ -4777,6 +4739,7 @@
         <p:nvCxnSpPr>
           <p:cNvPr id="86" name="Elbow Connector 85"/>
           <p:cNvCxnSpPr>
+            <a:cxnSpLocks/>
             <a:stCxn id="78" idx="3"/>
             <a:endCxn id="85" idx="1"/>
           </p:cNvCxnSpPr>
@@ -4785,7 +4748,7 @@
         <p:spPr>
           <a:xfrm>
             <a:off x="7277995" y="3034891"/>
-            <a:ext cx="434402" cy="641172"/>
+            <a:ext cx="434318" cy="334560"/>
           </a:xfrm>
           <a:prstGeom prst="bentConnector3">
             <a:avLst/>
@@ -4900,14 +4863,6 @@
                 </a:solidFill>
               </a:rPr>
               <a:t>&lt;&lt;interface&gt;&gt;</a:t>
-            </a:r>
-            <a:r>
-              <a:rPr lang="en-US" sz="1050">
-                <a:solidFill>
-                  <a:srgbClr val="7030A0"/>
-                </a:solidFill>
-              </a:rPr>
-              <a:t/>
             </a:r>
             <a:br>
               <a:rPr lang="en-US" sz="1050">
@@ -5988,6 +5943,525 @@
           </a:effectRef>
           <a:fontRef idx="minor">
             <a:schemeClr val="dk1"/>
+          </a:fontRef>
+        </p:style>
+      </p:cxnSp>
+      <p:cxnSp>
+        <p:nvCxnSpPr>
+          <p:cNvPr id="45" name="Elbow Connector 44">
+            <a:extLst>
+              <a:ext uri="{FF2B5EF4-FFF2-40B4-BE49-F238E27FC236}">
+                <a16:creationId xmlns:a16="http://schemas.microsoft.com/office/drawing/2014/main" id="{E16E63AF-16D2-384C-9B17-043BF18F114C}"/>
+              </a:ext>
+            </a:extLst>
+          </p:cNvPr>
+          <p:cNvCxnSpPr>
+            <a:endCxn id="76" idx="1"/>
+          </p:cNvCxnSpPr>
+          <p:nvPr/>
+        </p:nvCxnSpPr>
+        <p:spPr>
+          <a:xfrm rot="5400000" flipH="1" flipV="1">
+            <a:off x="7291662" y="2603228"/>
+            <a:ext cx="623360" cy="217941"/>
+          </a:xfrm>
+          <a:prstGeom prst="bentConnector2">
+            <a:avLst/>
+          </a:prstGeom>
+          <a:ln w="19050">
+            <a:solidFill>
+              <a:srgbClr val="7030A0"/>
+            </a:solidFill>
+            <a:headEnd type="none" w="med" len="med"/>
+            <a:tailEnd type="arrow" w="med" len="med"/>
+          </a:ln>
+          <a:effectLst/>
+        </p:spPr>
+        <p:style>
+          <a:lnRef idx="1">
+            <a:schemeClr val="accent2"/>
+          </a:lnRef>
+          <a:fillRef idx="2">
+            <a:schemeClr val="accent2"/>
+          </a:fillRef>
+          <a:effectRef idx="1">
+            <a:schemeClr val="accent2"/>
+          </a:effectRef>
+          <a:fontRef idx="minor">
+            <a:schemeClr val="dk1"/>
+          </a:fontRef>
+        </p:style>
+      </p:cxnSp>
+      <p:sp>
+        <p:nvSpPr>
+          <p:cNvPr id="103" name="Rectangle 8">
+            <a:extLst>
+              <a:ext uri="{FF2B5EF4-FFF2-40B4-BE49-F238E27FC236}">
+                <a16:creationId xmlns:a16="http://schemas.microsoft.com/office/drawing/2014/main" id="{F362D17D-8B10-5B46-BED1-5103F3ED6097}"/>
+              </a:ext>
+            </a:extLst>
+          </p:cNvPr>
+          <p:cNvSpPr/>
+          <p:nvPr/>
+        </p:nvSpPr>
+        <p:spPr>
+          <a:xfrm>
+            <a:off x="7804918" y="3717731"/>
+            <a:ext cx="708186" cy="285783"/>
+          </a:xfrm>
+          <a:prstGeom prst="rect">
+            <a:avLst/>
+          </a:prstGeom>
+          <a:ln w="19050">
+            <a:solidFill>
+              <a:srgbClr val="7030A0"/>
+            </a:solidFill>
+          </a:ln>
+          <a:effectLst/>
+        </p:spPr>
+        <p:style>
+          <a:lnRef idx="1">
+            <a:schemeClr val="accent4"/>
+          </a:lnRef>
+          <a:fillRef idx="2">
+            <a:schemeClr val="accent4"/>
+          </a:fillRef>
+          <a:effectRef idx="1">
+            <a:schemeClr val="accent4"/>
+          </a:effectRef>
+          <a:fontRef idx="minor">
+            <a:schemeClr val="dk1"/>
+          </a:fontRef>
+        </p:style>
+        <p:txBody>
+          <a:bodyPr rtlCol="0" anchor="ctr"/>
+          <a:lstStyle/>
+          <a:p>
+            <a:pPr algn="ctr"/>
+            <a:r>
+              <a:rPr lang="en-US" sz="1000" dirty="0">
+                <a:solidFill>
+                  <a:srgbClr val="7030A0"/>
+                </a:solidFill>
+              </a:rPr>
+              <a:t>Timetable</a:t>
+            </a:r>
+            <a:endParaRPr lang="en-SG" sz="1050" dirty="0">
+              <a:solidFill>
+                <a:srgbClr val="7030A0"/>
+              </a:solidFill>
+            </a:endParaRPr>
+          </a:p>
+        </p:txBody>
+      </p:sp>
+      <p:sp>
+        <p:nvSpPr>
+          <p:cNvPr id="104" name="Rectangle 8">
+            <a:extLst>
+              <a:ext uri="{FF2B5EF4-FFF2-40B4-BE49-F238E27FC236}">
+                <a16:creationId xmlns:a16="http://schemas.microsoft.com/office/drawing/2014/main" id="{79FBF214-B502-D241-BE09-D8F82A9F3E4E}"/>
+              </a:ext>
+            </a:extLst>
+          </p:cNvPr>
+          <p:cNvSpPr/>
+          <p:nvPr/>
+        </p:nvSpPr>
+        <p:spPr>
+          <a:xfrm>
+            <a:off x="7804918" y="4040708"/>
+            <a:ext cx="708186" cy="285783"/>
+          </a:xfrm>
+          <a:prstGeom prst="rect">
+            <a:avLst/>
+          </a:prstGeom>
+          <a:ln w="19050">
+            <a:solidFill>
+              <a:srgbClr val="7030A0"/>
+            </a:solidFill>
+          </a:ln>
+          <a:effectLst/>
+        </p:spPr>
+        <p:style>
+          <a:lnRef idx="1">
+            <a:schemeClr val="accent4"/>
+          </a:lnRef>
+          <a:fillRef idx="2">
+            <a:schemeClr val="accent4"/>
+          </a:fillRef>
+          <a:effectRef idx="1">
+            <a:schemeClr val="accent4"/>
+          </a:effectRef>
+          <a:fontRef idx="minor">
+            <a:schemeClr val="dk1"/>
+          </a:fontRef>
+        </p:style>
+        <p:txBody>
+          <a:bodyPr rtlCol="0" anchor="ctr"/>
+          <a:lstStyle/>
+          <a:p>
+            <a:pPr algn="ctr"/>
+            <a:r>
+              <a:rPr lang="en-US" sz="900" dirty="0">
+                <a:solidFill>
+                  <a:srgbClr val="7030A0"/>
+                </a:solidFill>
+              </a:rPr>
+              <a:t>Passwords</a:t>
+            </a:r>
+            <a:endParaRPr lang="en-SG" sz="1050" dirty="0">
+              <a:solidFill>
+                <a:srgbClr val="7030A0"/>
+              </a:solidFill>
+            </a:endParaRPr>
+          </a:p>
+        </p:txBody>
+      </p:sp>
+      <p:sp>
+        <p:nvSpPr>
+          <p:cNvPr id="105" name="Rectangle 8">
+            <a:extLst>
+              <a:ext uri="{FF2B5EF4-FFF2-40B4-BE49-F238E27FC236}">
+                <a16:creationId xmlns:a16="http://schemas.microsoft.com/office/drawing/2014/main" id="{5C7BEF09-CB87-D748-810D-F5191B937650}"/>
+              </a:ext>
+            </a:extLst>
+          </p:cNvPr>
+          <p:cNvSpPr/>
+          <p:nvPr/>
+        </p:nvSpPr>
+        <p:spPr>
+          <a:xfrm>
+            <a:off x="7804549" y="4381001"/>
+            <a:ext cx="708186" cy="285783"/>
+          </a:xfrm>
+          <a:prstGeom prst="rect">
+            <a:avLst/>
+          </a:prstGeom>
+          <a:ln w="19050">
+            <a:solidFill>
+              <a:srgbClr val="7030A0"/>
+            </a:solidFill>
+          </a:ln>
+          <a:effectLst/>
+        </p:spPr>
+        <p:style>
+          <a:lnRef idx="1">
+            <a:schemeClr val="accent4"/>
+          </a:lnRef>
+          <a:fillRef idx="2">
+            <a:schemeClr val="accent4"/>
+          </a:fillRef>
+          <a:effectRef idx="1">
+            <a:schemeClr val="accent4"/>
+          </a:effectRef>
+          <a:fontRef idx="minor">
+            <a:schemeClr val="dk1"/>
+          </a:fontRef>
+        </p:style>
+        <p:txBody>
+          <a:bodyPr rtlCol="0" anchor="ctr"/>
+          <a:lstStyle/>
+          <a:p>
+            <a:pPr algn="ctr"/>
+            <a:r>
+              <a:rPr lang="en-US" sz="1050" dirty="0">
+                <a:solidFill>
+                  <a:srgbClr val="7030A0"/>
+                </a:solidFill>
+              </a:rPr>
+              <a:t>Notes</a:t>
+            </a:r>
+            <a:endParaRPr lang="en-SG" sz="1050" dirty="0">
+              <a:solidFill>
+                <a:srgbClr val="7030A0"/>
+              </a:solidFill>
+            </a:endParaRPr>
+          </a:p>
+        </p:txBody>
+      </p:sp>
+      <p:sp>
+        <p:nvSpPr>
+          <p:cNvPr id="106" name="Rectangle 8">
+            <a:extLst>
+              <a:ext uri="{FF2B5EF4-FFF2-40B4-BE49-F238E27FC236}">
+                <a16:creationId xmlns:a16="http://schemas.microsoft.com/office/drawing/2014/main" id="{D3545687-EB2A-F04F-AEFC-1F028DF6A179}"/>
+              </a:ext>
+            </a:extLst>
+          </p:cNvPr>
+          <p:cNvSpPr/>
+          <p:nvPr/>
+        </p:nvSpPr>
+        <p:spPr>
+          <a:xfrm>
+            <a:off x="6802602" y="4018877"/>
+            <a:ext cx="708186" cy="346760"/>
+          </a:xfrm>
+          <a:prstGeom prst="rect">
+            <a:avLst/>
+          </a:prstGeom>
+          <a:ln w="19050">
+            <a:solidFill>
+              <a:srgbClr val="7030A0"/>
+            </a:solidFill>
+          </a:ln>
+          <a:effectLst/>
+        </p:spPr>
+        <p:style>
+          <a:lnRef idx="1">
+            <a:schemeClr val="accent4"/>
+          </a:lnRef>
+          <a:fillRef idx="2">
+            <a:schemeClr val="accent4"/>
+          </a:fillRef>
+          <a:effectRef idx="1">
+            <a:schemeClr val="accent4"/>
+          </a:effectRef>
+          <a:fontRef idx="minor">
+            <a:schemeClr val="dk1"/>
+          </a:fontRef>
+        </p:style>
+        <p:txBody>
+          <a:bodyPr rtlCol="0" anchor="ctr"/>
+          <a:lstStyle/>
+          <a:p>
+            <a:pPr algn="ctr"/>
+            <a:r>
+              <a:rPr lang="en-US" sz="1050" dirty="0">
+                <a:solidFill>
+                  <a:srgbClr val="7030A0"/>
+                </a:solidFill>
+              </a:rPr>
+              <a:t>Self</a:t>
+            </a:r>
+            <a:endParaRPr lang="en-SG" sz="1050" dirty="0">
+              <a:solidFill>
+                <a:srgbClr val="7030A0"/>
+              </a:solidFill>
+            </a:endParaRPr>
+          </a:p>
+        </p:txBody>
+      </p:sp>
+      <p:cxnSp>
+        <p:nvCxnSpPr>
+          <p:cNvPr id="101" name="Straight Arrow Connector 100">
+            <a:extLst>
+              <a:ext uri="{FF2B5EF4-FFF2-40B4-BE49-F238E27FC236}">
+                <a16:creationId xmlns:a16="http://schemas.microsoft.com/office/drawing/2014/main" id="{F84A00F0-742A-1B4F-8F07-53E9CAE944B4}"/>
+              </a:ext>
+            </a:extLst>
+          </p:cNvPr>
+          <p:cNvCxnSpPr>
+            <a:cxnSpLocks/>
+            <a:stCxn id="106" idx="3"/>
+            <a:endCxn id="104" idx="1"/>
+          </p:cNvCxnSpPr>
+          <p:nvPr/>
+        </p:nvCxnSpPr>
+        <p:spPr>
+          <a:xfrm flipV="1">
+            <a:off x="7510788" y="4183600"/>
+            <a:ext cx="294130" cy="8657"/>
+          </a:xfrm>
+          <a:prstGeom prst="straightConnector1">
+            <a:avLst/>
+          </a:prstGeom>
+          <a:ln w="19050">
+            <a:solidFill>
+              <a:srgbClr val="7030A0"/>
+            </a:solidFill>
+            <a:headEnd type="none" w="med" len="med"/>
+            <a:tailEnd type="arrow" w="med" len="med"/>
+          </a:ln>
+          <a:effectLst/>
+        </p:spPr>
+        <p:style>
+          <a:lnRef idx="1">
+            <a:schemeClr val="accent2"/>
+          </a:lnRef>
+          <a:fillRef idx="2">
+            <a:schemeClr val="accent2"/>
+          </a:fillRef>
+          <a:effectRef idx="1">
+            <a:schemeClr val="accent2"/>
+          </a:effectRef>
+          <a:fontRef idx="minor">
+            <a:schemeClr val="dk1"/>
+          </a:fontRef>
+        </p:style>
+      </p:cxnSp>
+      <p:cxnSp>
+        <p:nvCxnSpPr>
+          <p:cNvPr id="121" name="Straight Arrow Connector 120">
+            <a:extLst>
+              <a:ext uri="{FF2B5EF4-FFF2-40B4-BE49-F238E27FC236}">
+                <a16:creationId xmlns:a16="http://schemas.microsoft.com/office/drawing/2014/main" id="{B94E4530-0399-5C45-8A3C-74E81078462D}"/>
+              </a:ext>
+            </a:extLst>
+          </p:cNvPr>
+          <p:cNvCxnSpPr>
+            <a:cxnSpLocks/>
+          </p:cNvCxnSpPr>
+          <p:nvPr/>
+        </p:nvCxnSpPr>
+        <p:spPr>
+          <a:xfrm>
+            <a:off x="7639411" y="4523892"/>
+            <a:ext cx="167937" cy="0"/>
+          </a:xfrm>
+          <a:prstGeom prst="straightConnector1">
+            <a:avLst/>
+          </a:prstGeom>
+          <a:ln w="19050">
+            <a:solidFill>
+              <a:srgbClr val="7030A0"/>
+            </a:solidFill>
+            <a:headEnd type="none" w="med" len="med"/>
+            <a:tailEnd type="arrow" w="med" len="med"/>
+          </a:ln>
+          <a:effectLst/>
+        </p:spPr>
+        <p:style>
+          <a:lnRef idx="1">
+            <a:schemeClr val="accent2"/>
+          </a:lnRef>
+          <a:fillRef idx="2">
+            <a:schemeClr val="accent2"/>
+          </a:fillRef>
+          <a:effectRef idx="1">
+            <a:schemeClr val="accent2"/>
+          </a:effectRef>
+          <a:fontRef idx="minor">
+            <a:schemeClr val="dk1"/>
+          </a:fontRef>
+        </p:style>
+      </p:cxnSp>
+      <p:cxnSp>
+        <p:nvCxnSpPr>
+          <p:cNvPr id="123" name="Straight Arrow Connector 122">
+            <a:extLst>
+              <a:ext uri="{FF2B5EF4-FFF2-40B4-BE49-F238E27FC236}">
+                <a16:creationId xmlns:a16="http://schemas.microsoft.com/office/drawing/2014/main" id="{BF00CFFB-9373-F349-80CF-F551E4B77B2E}"/>
+              </a:ext>
+            </a:extLst>
+          </p:cNvPr>
+          <p:cNvCxnSpPr>
+            <a:cxnSpLocks/>
+          </p:cNvCxnSpPr>
+          <p:nvPr/>
+        </p:nvCxnSpPr>
+        <p:spPr>
+          <a:xfrm>
+            <a:off x="7639411" y="3867327"/>
+            <a:ext cx="165507" cy="0"/>
+          </a:xfrm>
+          <a:prstGeom prst="straightConnector1">
+            <a:avLst/>
+          </a:prstGeom>
+          <a:ln w="19050">
+            <a:solidFill>
+              <a:srgbClr val="7030A0"/>
+            </a:solidFill>
+            <a:headEnd type="none" w="med" len="med"/>
+            <a:tailEnd type="arrow" w="med" len="med"/>
+          </a:ln>
+          <a:effectLst/>
+        </p:spPr>
+        <p:style>
+          <a:lnRef idx="1">
+            <a:schemeClr val="accent2"/>
+          </a:lnRef>
+          <a:fillRef idx="2">
+            <a:schemeClr val="accent2"/>
+          </a:fillRef>
+          <a:effectRef idx="1">
+            <a:schemeClr val="accent2"/>
+          </a:effectRef>
+          <a:fontRef idx="minor">
+            <a:schemeClr val="dk1"/>
+          </a:fontRef>
+        </p:style>
+      </p:cxnSp>
+      <p:cxnSp>
+        <p:nvCxnSpPr>
+          <p:cNvPr id="130" name="Straight Arrow Connector 129">
+            <a:extLst>
+              <a:ext uri="{FF2B5EF4-FFF2-40B4-BE49-F238E27FC236}">
+                <a16:creationId xmlns:a16="http://schemas.microsoft.com/office/drawing/2014/main" id="{67CEBDFB-39E1-184E-BE53-1361C0287345}"/>
+              </a:ext>
+            </a:extLst>
+          </p:cNvPr>
+          <p:cNvCxnSpPr>
+            <a:cxnSpLocks/>
+            <a:stCxn id="78" idx="2"/>
+            <a:endCxn id="106" idx="0"/>
+          </p:cNvCxnSpPr>
+          <p:nvPr/>
+        </p:nvCxnSpPr>
+        <p:spPr>
+          <a:xfrm flipH="1">
+            <a:off x="7156695" y="3121581"/>
+            <a:ext cx="3276" cy="897296"/>
+          </a:xfrm>
+          <a:prstGeom prst="straightConnector1">
+            <a:avLst/>
+          </a:prstGeom>
+          <a:ln w="19050">
+            <a:solidFill>
+              <a:srgbClr val="7030A0"/>
+            </a:solidFill>
+            <a:headEnd type="none" w="med" len="med"/>
+            <a:tailEnd type="arrow" w="med" len="med"/>
+          </a:ln>
+          <a:effectLst/>
+        </p:spPr>
+        <p:style>
+          <a:lnRef idx="1">
+            <a:schemeClr val="accent2"/>
+          </a:lnRef>
+          <a:fillRef idx="2">
+            <a:schemeClr val="accent2"/>
+          </a:fillRef>
+          <a:effectRef idx="1">
+            <a:schemeClr val="accent2"/>
+          </a:effectRef>
+          <a:fontRef idx="minor">
+            <a:schemeClr val="dk1"/>
+          </a:fontRef>
+        </p:style>
+      </p:cxnSp>
+      <p:cxnSp>
+        <p:nvCxnSpPr>
+          <p:cNvPr id="140" name="Straight Connector 139">
+            <a:extLst>
+              <a:ext uri="{FF2B5EF4-FFF2-40B4-BE49-F238E27FC236}">
+                <a16:creationId xmlns:a16="http://schemas.microsoft.com/office/drawing/2014/main" id="{DBED3EC9-4E69-B642-8811-AE3C5CD02717}"/>
+              </a:ext>
+            </a:extLst>
+          </p:cNvPr>
+          <p:cNvCxnSpPr/>
+          <p:nvPr/>
+        </p:nvCxnSpPr>
+        <p:spPr>
+          <a:xfrm>
+            <a:off x="7639411" y="3852914"/>
+            <a:ext cx="0" cy="678686"/>
+          </a:xfrm>
+          <a:prstGeom prst="line">
+            <a:avLst/>
+          </a:prstGeom>
+          <a:ln w="19050"/>
+        </p:spPr>
+        <p:style>
+          <a:lnRef idx="1">
+            <a:schemeClr val="accent4"/>
+          </a:lnRef>
+          <a:fillRef idx="0">
+            <a:schemeClr val="accent4"/>
+          </a:fillRef>
+          <a:effectRef idx="0">
+            <a:schemeClr val="accent4"/>
+          </a:effectRef>
+          <a:fontRef idx="minor">
+            <a:schemeClr val="tx1"/>
           </a:fontRef>
         </p:style>
       </p:cxnSp>

</xml_diff>

<commit_message>
Made updates to the Developer Guide's Model and Storage Diagrams.
</commit_message>
<xml_diff>
--- a/docs/diagrams/ModelComponentClassBetterOopDiagram.pptx
+++ b/docs/diagrams/ModelComponentClassBetterOopDiagram.pptx
@@ -208,7 +208,7 @@
           <a:p>
             <a:fld id="{F5CC4B3F-88C1-4FFA-B1B6-F41C21DC6924}" type="datetimeFigureOut">
               <a:rPr lang="en-US" smtClean="0"/>
-              <a:t>10/23/18</a:t>
+              <a:t>11/12/18</a:t>
             </a:fld>
             <a:endParaRPr lang="en-US"/>
           </a:p>
@@ -654,7 +654,7 @@
           <a:p>
             <a:fld id="{78C97017-6FC3-485B-9764-EAC9E56C1D49}" type="datetimeFigureOut">
               <a:rPr lang="en-US" smtClean="0"/>
-              <a:t>10/23/18</a:t>
+              <a:t>11/12/18</a:t>
             </a:fld>
             <a:endParaRPr lang="en-US"/>
           </a:p>
@@ -822,7 +822,7 @@
           <a:p>
             <a:fld id="{78C97017-6FC3-485B-9764-EAC9E56C1D49}" type="datetimeFigureOut">
               <a:rPr lang="en-US" smtClean="0"/>
-              <a:t>10/23/18</a:t>
+              <a:t>11/12/18</a:t>
             </a:fld>
             <a:endParaRPr lang="en-US"/>
           </a:p>
@@ -1000,7 +1000,7 @@
           <a:p>
             <a:fld id="{78C97017-6FC3-485B-9764-EAC9E56C1D49}" type="datetimeFigureOut">
               <a:rPr lang="en-US" smtClean="0"/>
-              <a:t>10/23/18</a:t>
+              <a:t>11/12/18</a:t>
             </a:fld>
             <a:endParaRPr lang="en-US"/>
           </a:p>
@@ -1168,7 +1168,7 @@
           <a:p>
             <a:fld id="{78C97017-6FC3-485B-9764-EAC9E56C1D49}" type="datetimeFigureOut">
               <a:rPr lang="en-US" smtClean="0"/>
-              <a:t>10/23/18</a:t>
+              <a:t>11/12/18</a:t>
             </a:fld>
             <a:endParaRPr lang="en-US"/>
           </a:p>
@@ -1413,7 +1413,7 @@
           <a:p>
             <a:fld id="{78C97017-6FC3-485B-9764-EAC9E56C1D49}" type="datetimeFigureOut">
               <a:rPr lang="en-US" smtClean="0"/>
-              <a:t>10/23/18</a:t>
+              <a:t>11/12/18</a:t>
             </a:fld>
             <a:endParaRPr lang="en-US"/>
           </a:p>
@@ -1698,7 +1698,7 @@
           <a:p>
             <a:fld id="{78C97017-6FC3-485B-9764-EAC9E56C1D49}" type="datetimeFigureOut">
               <a:rPr lang="en-US" smtClean="0"/>
-              <a:t>10/23/18</a:t>
+              <a:t>11/12/18</a:t>
             </a:fld>
             <a:endParaRPr lang="en-US"/>
           </a:p>
@@ -2117,7 +2117,7 @@
           <a:p>
             <a:fld id="{78C97017-6FC3-485B-9764-EAC9E56C1D49}" type="datetimeFigureOut">
               <a:rPr lang="en-US" smtClean="0"/>
-              <a:t>10/23/18</a:t>
+              <a:t>11/12/18</a:t>
             </a:fld>
             <a:endParaRPr lang="en-US"/>
           </a:p>
@@ -2234,7 +2234,7 @@
           <a:p>
             <a:fld id="{78C97017-6FC3-485B-9764-EAC9E56C1D49}" type="datetimeFigureOut">
               <a:rPr lang="en-US" smtClean="0"/>
-              <a:t>10/23/18</a:t>
+              <a:t>11/12/18</a:t>
             </a:fld>
             <a:endParaRPr lang="en-US"/>
           </a:p>
@@ -2329,7 +2329,7 @@
           <a:p>
             <a:fld id="{78C97017-6FC3-485B-9764-EAC9E56C1D49}" type="datetimeFigureOut">
               <a:rPr lang="en-US" smtClean="0"/>
-              <a:t>10/23/18</a:t>
+              <a:t>11/12/18</a:t>
             </a:fld>
             <a:endParaRPr lang="en-US"/>
           </a:p>
@@ -2604,7 +2604,7 @@
           <a:p>
             <a:fld id="{78C97017-6FC3-485B-9764-EAC9E56C1D49}" type="datetimeFigureOut">
               <a:rPr lang="en-US" smtClean="0"/>
-              <a:t>10/23/18</a:t>
+              <a:t>11/12/18</a:t>
             </a:fld>
             <a:endParaRPr lang="en-US"/>
           </a:p>
@@ -2856,7 +2856,7 @@
           <a:p>
             <a:fld id="{78C97017-6FC3-485B-9764-EAC9E56C1D49}" type="datetimeFigureOut">
               <a:rPr lang="en-US" smtClean="0"/>
-              <a:t>10/23/18</a:t>
+              <a:t>11/12/18</a:t>
             </a:fld>
             <a:endParaRPr lang="en-US"/>
           </a:p>
@@ -3067,7 +3067,7 @@
           <a:p>
             <a:fld id="{78C97017-6FC3-485B-9764-EAC9E56C1D49}" type="datetimeFigureOut">
               <a:rPr lang="en-US" smtClean="0"/>
-              <a:t>10/23/18</a:t>
+              <a:t>11/12/18</a:t>
             </a:fld>
             <a:endParaRPr lang="en-US"/>
           </a:p>
@@ -3450,8 +3450,8 @@
         </p:nvSpPr>
         <p:spPr>
           <a:xfrm>
-            <a:off x="1119865" y="1676400"/>
-            <a:ext cx="7490735" cy="3059747"/>
+            <a:off x="1119865" y="564860"/>
+            <a:ext cx="7490735" cy="4171287"/>
           </a:xfrm>
           <a:prstGeom prst="roundRect">
             <a:avLst>
@@ -3626,17 +3626,19 @@
           <p:cNvPr id="107" name="Elbow Connector 106"/>
           <p:cNvCxnSpPr>
             <a:cxnSpLocks/>
+            <a:stCxn id="9" idx="1"/>
+            <a:endCxn id="62" idx="2"/>
           </p:cNvCxnSpPr>
           <p:nvPr/>
         </p:nvCxnSpPr>
         <p:spPr>
           <a:xfrm rot="5400000" flipH="1" flipV="1">
-            <a:off x="4155901" y="1308943"/>
-            <a:ext cx="613122" cy="4459404"/>
+            <a:off x="4234918" y="1354891"/>
+            <a:ext cx="436504" cy="4489609"/>
           </a:xfrm>
           <a:prstGeom prst="bentConnector3">
             <a:avLst>
-              <a:gd name="adj1" fmla="val -26668"/>
+              <a:gd name="adj1" fmla="val -52673"/>
             </a:avLst>
           </a:prstGeom>
           <a:ln w="19050">
@@ -3959,7 +3961,7 @@
         </p:nvSpPr>
         <p:spPr>
           <a:xfrm>
-            <a:off x="2786406" y="2834911"/>
+            <a:off x="2831421" y="3045300"/>
             <a:ext cx="1447688" cy="346760"/>
           </a:xfrm>
           <a:prstGeom prst="rect">
@@ -4017,9 +4019,9 @@
           <p:nvPr/>
         </p:nvCxnSpPr>
         <p:spPr>
-          <a:xfrm>
-            <a:off x="2624360" y="3003033"/>
-            <a:ext cx="162046" cy="5258"/>
+          <a:xfrm flipV="1">
+            <a:off x="2629463" y="3218680"/>
+            <a:ext cx="201958" cy="3093"/>
           </a:xfrm>
           <a:prstGeom prst="straightConnector1">
             <a:avLst/>
@@ -4056,7 +4058,7 @@
         </p:nvSpPr>
         <p:spPr>
           <a:xfrm>
-            <a:off x="2388312" y="2916343"/>
+            <a:off x="2393415" y="3135083"/>
             <a:ext cx="236048" cy="173380"/>
           </a:xfrm>
           <a:prstGeom prst="flowChartDecision">
@@ -4101,7 +4103,7 @@
         </p:nvSpPr>
         <p:spPr>
           <a:xfrm>
-            <a:off x="4762209" y="2863434"/>
+            <a:off x="4792414" y="3040052"/>
             <a:ext cx="1156969" cy="346760"/>
           </a:xfrm>
           <a:prstGeom prst="rect">
@@ -4157,7 +4159,7 @@
         </p:nvSpPr>
         <p:spPr>
           <a:xfrm>
-            <a:off x="4233246" y="2948201"/>
+            <a:off x="4263451" y="3124819"/>
             <a:ext cx="236048" cy="173380"/>
           </a:xfrm>
           <a:prstGeom prst="flowChartDecision">
@@ -4207,7 +4209,7 @@
         </p:nvCxnSpPr>
         <p:spPr>
           <a:xfrm>
-            <a:off x="4469294" y="3034891"/>
+            <a:off x="4499499" y="3211509"/>
             <a:ext cx="292915" cy="1923"/>
           </a:xfrm>
           <a:prstGeom prst="bentConnector3">
@@ -4245,7 +4247,7 @@
         </p:nvSpPr>
         <p:spPr>
           <a:xfrm>
-            <a:off x="6313677" y="2858066"/>
+            <a:off x="6343882" y="3034684"/>
             <a:ext cx="708186" cy="346760"/>
           </a:xfrm>
           <a:prstGeom prst="rect">
@@ -4301,7 +4303,7 @@
         </p:nvSpPr>
         <p:spPr>
           <a:xfrm>
-            <a:off x="5918460" y="2941065"/>
+            <a:off x="5948665" y="3117683"/>
             <a:ext cx="236048" cy="173380"/>
           </a:xfrm>
           <a:prstGeom prst="flowChartDecision">
@@ -4350,7 +4352,7 @@
         </p:nvCxnSpPr>
         <p:spPr>
           <a:xfrm>
-            <a:off x="6154508" y="3027755"/>
+            <a:off x="6184713" y="3204373"/>
             <a:ext cx="159169" cy="3691"/>
           </a:xfrm>
           <a:prstGeom prst="bentConnector3">
@@ -4388,7 +4390,7 @@
         </p:nvSpPr>
         <p:spPr>
           <a:xfrm>
-            <a:off x="7712397" y="2564238"/>
+            <a:off x="7742602" y="2740856"/>
             <a:ext cx="708186" cy="285783"/>
           </a:xfrm>
           <a:prstGeom prst="rect">
@@ -4444,7 +4446,7 @@
         </p:nvSpPr>
         <p:spPr>
           <a:xfrm>
-            <a:off x="7041947" y="2948201"/>
+            <a:off x="7072152" y="3124819"/>
             <a:ext cx="236048" cy="173380"/>
           </a:xfrm>
           <a:prstGeom prst="flowChartDecision">
@@ -4493,7 +4495,7 @@
         </p:nvCxnSpPr>
         <p:spPr>
           <a:xfrm flipV="1">
-            <a:off x="7277995" y="2706821"/>
+            <a:off x="7308200" y="2883439"/>
             <a:ext cx="434402" cy="327761"/>
           </a:xfrm>
           <a:prstGeom prst="bentConnector3">
@@ -4531,7 +4533,7 @@
         </p:nvSpPr>
         <p:spPr>
           <a:xfrm>
-            <a:off x="7712397" y="2887216"/>
+            <a:off x="7742602" y="3063834"/>
             <a:ext cx="708186" cy="285783"/>
           </a:xfrm>
           <a:prstGeom prst="rect">
@@ -4590,7 +4592,7 @@
         </p:nvCxnSpPr>
         <p:spPr>
           <a:xfrm flipV="1">
-            <a:off x="7277995" y="3030108"/>
+            <a:off x="7308200" y="3206726"/>
             <a:ext cx="434402" cy="4783"/>
           </a:xfrm>
           <a:prstGeom prst="bentConnector3">
@@ -4628,7 +4630,7 @@
         </p:nvSpPr>
         <p:spPr>
           <a:xfrm>
-            <a:off x="7712397" y="3210194"/>
+            <a:off x="7742602" y="3386812"/>
             <a:ext cx="708186" cy="285783"/>
           </a:xfrm>
           <a:prstGeom prst="rect">
@@ -4687,7 +4689,7 @@
         </p:nvCxnSpPr>
         <p:spPr>
           <a:xfrm>
-            <a:off x="7277995" y="3034891"/>
+            <a:off x="7308200" y="3211509"/>
             <a:ext cx="434402" cy="318195"/>
           </a:xfrm>
           <a:prstGeom prst="bentConnector3">
@@ -4725,7 +4727,7 @@
         </p:nvSpPr>
         <p:spPr>
           <a:xfrm>
-            <a:off x="7712397" y="3533171"/>
+            <a:off x="7742602" y="3709789"/>
             <a:ext cx="708186" cy="285783"/>
           </a:xfrm>
           <a:prstGeom prst="rect">
@@ -4784,7 +4786,7 @@
         </p:nvCxnSpPr>
         <p:spPr>
           <a:xfrm>
-            <a:off x="7277995" y="3034891"/>
+            <a:off x="7308200" y="3211509"/>
             <a:ext cx="434402" cy="641172"/>
           </a:xfrm>
           <a:prstGeom prst="bentConnector3">
@@ -4822,7 +4824,7 @@
         </p:nvSpPr>
         <p:spPr>
           <a:xfrm rot="16200000">
-            <a:off x="6362886" y="3586305"/>
+            <a:off x="6362492" y="3719702"/>
             <a:ext cx="881018" cy="261610"/>
           </a:xfrm>
           <a:prstGeom prst="rect">
@@ -4974,7 +4976,7 @@
         </p:nvSpPr>
         <p:spPr>
           <a:xfrm>
-            <a:off x="4324972" y="3058864"/>
+            <a:off x="4355177" y="3235482"/>
             <a:ext cx="189257" cy="178683"/>
           </a:xfrm>
           <a:prstGeom prst="rect">
@@ -5013,7 +5015,7 @@
         </p:nvSpPr>
         <p:spPr>
           <a:xfrm>
-            <a:off x="6135256" y="3097917"/>
+            <a:off x="6165461" y="3274535"/>
             <a:ext cx="189257" cy="178683"/>
           </a:xfrm>
           <a:prstGeom prst="rect">
@@ -5052,7 +5054,7 @@
         </p:nvSpPr>
         <p:spPr>
           <a:xfrm>
-            <a:off x="2560167" y="2753818"/>
+            <a:off x="2750205" y="3238777"/>
             <a:ext cx="78378" cy="193767"/>
           </a:xfrm>
           <a:prstGeom prst="rect">
@@ -5130,7 +5132,7 @@
         </p:nvSpPr>
         <p:spPr>
           <a:xfrm>
-            <a:off x="6449896" y="3204826"/>
+            <a:off x="6480101" y="3381444"/>
             <a:ext cx="189257" cy="178683"/>
           </a:xfrm>
           <a:prstGeom prst="rect">
@@ -5175,7 +5177,7 @@
         </p:nvSpPr>
         <p:spPr>
           <a:xfrm>
-            <a:off x="4755872" y="2206861"/>
+            <a:off x="4786077" y="2383479"/>
             <a:ext cx="1156969" cy="285783"/>
           </a:xfrm>
           <a:prstGeom prst="rect">
@@ -5234,15 +5236,15 @@
           </p:cNvPr>
           <p:cNvCxnSpPr>
             <a:cxnSpLocks/>
-            <a:stCxn id="54" idx="0"/>
+            <a:stCxn id="51" idx="0"/>
             <a:endCxn id="52" idx="1"/>
           </p:cNvCxnSpPr>
           <p:nvPr/>
         </p:nvCxnSpPr>
         <p:spPr>
           <a:xfrm rot="5400000" flipH="1" flipV="1">
-            <a:off x="4233181" y="2536174"/>
-            <a:ext cx="709111" cy="336271"/>
+            <a:off x="4284552" y="2623294"/>
+            <a:ext cx="598448" cy="404602"/>
           </a:xfrm>
           <a:prstGeom prst="bentConnector2">
             <a:avLst/>
@@ -5285,7 +5287,7 @@
         </p:nvSpPr>
         <p:spPr>
           <a:xfrm>
-            <a:off x="6714344" y="2430721"/>
+            <a:off x="6744549" y="2607339"/>
             <a:ext cx="189257" cy="178683"/>
           </a:xfrm>
           <a:prstGeom prst="rect">
@@ -5330,7 +5332,7 @@
         </p:nvSpPr>
         <p:spPr>
           <a:xfrm rot="16200000">
-            <a:off x="6553482" y="2664721"/>
+            <a:off x="6583687" y="2841339"/>
             <a:ext cx="236048" cy="173380"/>
           </a:xfrm>
           <a:prstGeom prst="flowChartDecision">
@@ -5378,14 +5380,15 @@
           </p:cNvPr>
           <p:cNvCxnSpPr>
             <a:cxnSpLocks/>
+            <a:stCxn id="52" idx="3"/>
             <a:endCxn id="67" idx="1"/>
           </p:cNvCxnSpPr>
           <p:nvPr/>
         </p:nvCxnSpPr>
         <p:spPr>
           <a:xfrm flipV="1">
-            <a:off x="5884280" y="2233006"/>
-            <a:ext cx="432916" cy="111294"/>
+            <a:off x="5943046" y="2409624"/>
+            <a:ext cx="404355" cy="116747"/>
           </a:xfrm>
           <a:prstGeom prst="bentConnector3">
             <a:avLst/>
@@ -5428,7 +5431,7 @@
         </p:nvSpPr>
         <p:spPr>
           <a:xfrm>
-            <a:off x="6317196" y="2059626"/>
+            <a:off x="6347401" y="2236244"/>
             <a:ext cx="708186" cy="346760"/>
           </a:xfrm>
           <a:prstGeom prst="rect">
@@ -5490,7 +5493,7 @@
         </p:nvSpPr>
         <p:spPr>
           <a:xfrm>
-            <a:off x="6135256" y="2278014"/>
+            <a:off x="6165461" y="2454632"/>
             <a:ext cx="189257" cy="178683"/>
           </a:xfrm>
           <a:prstGeom prst="rect">
@@ -5535,7 +5538,7 @@
         </p:nvSpPr>
         <p:spPr>
           <a:xfrm>
-            <a:off x="4367100" y="2172972"/>
+            <a:off x="4397305" y="2349590"/>
             <a:ext cx="189257" cy="178683"/>
           </a:xfrm>
           <a:prstGeom prst="rect">
@@ -5580,7 +5583,7 @@
         </p:nvSpPr>
         <p:spPr>
           <a:xfrm>
-            <a:off x="5911329" y="2262081"/>
+            <a:off x="5941534" y="2438699"/>
             <a:ext cx="236048" cy="173380"/>
           </a:xfrm>
           <a:prstGeom prst="flowChartDecision">
@@ -5637,7 +5640,7 @@
         </p:nvCxnSpPr>
         <p:spPr>
           <a:xfrm rot="16200000" flipV="1">
-            <a:off x="6557898" y="2519778"/>
+            <a:off x="6588103" y="2696396"/>
             <a:ext cx="227001" cy="217"/>
           </a:xfrm>
           <a:prstGeom prst="bentConnector3">
@@ -5673,18 +5676,19 @@
         <p:nvCxnSpPr>
           <p:cNvPr id="90" name="Elbow Connector 63"/>
           <p:cNvCxnSpPr>
+            <a:cxnSpLocks/>
             <a:stCxn id="91" idx="3"/>
           </p:cNvCxnSpPr>
           <p:nvPr/>
         </p:nvCxnSpPr>
         <p:spPr>
-          <a:xfrm rot="5400000">
-            <a:off x="3470636" y="2687353"/>
-            <a:ext cx="293825" cy="5938"/>
+          <a:xfrm rot="16200000" flipH="1">
+            <a:off x="3218292" y="2026530"/>
+            <a:ext cx="1502537" cy="527372"/>
           </a:xfrm>
           <a:prstGeom prst="bentConnector3">
             <a:avLst>
-              <a:gd name="adj1" fmla="val 50000"/>
+              <a:gd name="adj1" fmla="val 15225"/>
             </a:avLst>
           </a:prstGeom>
           <a:ln w="19050">
@@ -5720,7 +5724,7 @@
         </p:nvSpPr>
         <p:spPr>
           <a:xfrm rot="10800000" flipV="1">
-            <a:off x="3479324" y="2386348"/>
+            <a:off x="3564681" y="1381886"/>
             <a:ext cx="282387" cy="157062"/>
           </a:xfrm>
           <a:prstGeom prst="triangle">
@@ -5768,7 +5772,7 @@
         </p:nvSpPr>
         <p:spPr>
           <a:xfrm>
-            <a:off x="1177947" y="1998144"/>
+            <a:off x="1263304" y="993682"/>
             <a:ext cx="1443661" cy="364396"/>
           </a:xfrm>
           <a:prstGeom prst="rect">
@@ -5839,7 +5843,7 @@
         </p:nvSpPr>
         <p:spPr>
           <a:xfrm>
-            <a:off x="3087206" y="1998144"/>
+            <a:off x="3172563" y="993682"/>
             <a:ext cx="1060683" cy="364396"/>
           </a:xfrm>
           <a:prstGeom prst="rect">
@@ -5895,7 +5899,7 @@
         </p:nvSpPr>
         <p:spPr>
           <a:xfrm rot="16200000">
-            <a:off x="2586098" y="2068952"/>
+            <a:off x="2671455" y="1064490"/>
             <a:ext cx="271014" cy="187417"/>
           </a:xfrm>
           <a:prstGeom prst="triangle">
@@ -5950,7 +5954,7 @@
         </p:nvCxnSpPr>
         <p:spPr>
           <a:xfrm>
-            <a:off x="2815314" y="2177521"/>
+            <a:off x="2900671" y="1173059"/>
             <a:ext cx="271892" cy="2821"/>
           </a:xfrm>
           <a:prstGeom prst="bentConnector3">
@@ -5997,7 +6001,7 @@
         </p:nvSpPr>
         <p:spPr>
           <a:xfrm>
-            <a:off x="7709338" y="2237286"/>
+            <a:off x="7739543" y="2413904"/>
             <a:ext cx="708186" cy="285783"/>
           </a:xfrm>
           <a:prstGeom prst="rect">
@@ -6062,7 +6066,7 @@
         </p:nvCxnSpPr>
         <p:spPr>
           <a:xfrm flipV="1">
-            <a:off x="7277995" y="2380178"/>
+            <a:off x="7308200" y="2556796"/>
             <a:ext cx="431343" cy="654713"/>
           </a:xfrm>
           <a:prstGeom prst="bentConnector3">
@@ -6106,7 +6110,7 @@
         </p:nvSpPr>
         <p:spPr>
           <a:xfrm>
-            <a:off x="7458905" y="2240908"/>
+            <a:off x="7489110" y="2417526"/>
             <a:ext cx="189257" cy="178683"/>
           </a:xfrm>
           <a:prstGeom prst="rect">
@@ -6128,6 +6132,550 @@
                 </a:solidFill>
               </a:rPr>
               <a:t>*</a:t>
+            </a:r>
+            <a:endParaRPr lang="en-SG" sz="1100" dirty="0">
+              <a:solidFill>
+                <a:srgbClr val="7030A0"/>
+              </a:solidFill>
+            </a:endParaRPr>
+          </a:p>
+        </p:txBody>
+      </p:sp>
+      <p:sp>
+        <p:nvSpPr>
+          <p:cNvPr id="73" name="Rectangle 8">
+            <a:extLst>
+              <a:ext uri="{FF2B5EF4-FFF2-40B4-BE49-F238E27FC236}">
+                <a16:creationId xmlns:a16="http://schemas.microsoft.com/office/drawing/2014/main" id="{10C6A658-032C-234D-9698-242783C2A5D8}"/>
+              </a:ext>
+            </a:extLst>
+          </p:cNvPr>
+          <p:cNvSpPr/>
+          <p:nvPr/>
+        </p:nvSpPr>
+        <p:spPr>
+          <a:xfrm>
+            <a:off x="7742602" y="4041702"/>
+            <a:ext cx="708186" cy="285783"/>
+          </a:xfrm>
+          <a:prstGeom prst="rect">
+            <a:avLst/>
+          </a:prstGeom>
+          <a:ln w="19050">
+            <a:solidFill>
+              <a:srgbClr val="7030A0"/>
+            </a:solidFill>
+          </a:ln>
+          <a:effectLst/>
+        </p:spPr>
+        <p:style>
+          <a:lnRef idx="1">
+            <a:schemeClr val="accent4"/>
+          </a:lnRef>
+          <a:fillRef idx="2">
+            <a:schemeClr val="accent4"/>
+          </a:fillRef>
+          <a:effectRef idx="1">
+            <a:schemeClr val="accent4"/>
+          </a:effectRef>
+          <a:fontRef idx="minor">
+            <a:schemeClr val="dk1"/>
+          </a:fontRef>
+        </p:style>
+        <p:txBody>
+          <a:bodyPr rtlCol="0" anchor="ctr"/>
+          <a:lstStyle/>
+          <a:p>
+            <a:pPr algn="ctr"/>
+            <a:r>
+              <a:rPr lang="en-US" sz="750" dirty="0" err="1">
+                <a:solidFill>
+                  <a:srgbClr val="7030A0"/>
+                </a:solidFill>
+              </a:rPr>
+              <a:t>TimeSlots</a:t>
+            </a:r>
+            <a:endParaRPr lang="en-SG" sz="750" dirty="0">
+              <a:solidFill>
+                <a:srgbClr val="7030A0"/>
+              </a:solidFill>
+            </a:endParaRPr>
+          </a:p>
+        </p:txBody>
+      </p:sp>
+      <p:cxnSp>
+        <p:nvCxnSpPr>
+          <p:cNvPr id="74" name="Elbow Connector 73">
+            <a:extLst>
+              <a:ext uri="{FF2B5EF4-FFF2-40B4-BE49-F238E27FC236}">
+                <a16:creationId xmlns:a16="http://schemas.microsoft.com/office/drawing/2014/main" id="{429A1E45-6BAC-D842-B02F-8082AA120259}"/>
+              </a:ext>
+            </a:extLst>
+          </p:cNvPr>
+          <p:cNvCxnSpPr>
+            <a:cxnSpLocks/>
+            <a:stCxn id="78" idx="3"/>
+            <a:endCxn id="73" idx="1"/>
+          </p:cNvCxnSpPr>
+          <p:nvPr/>
+        </p:nvCxnSpPr>
+        <p:spPr>
+          <a:xfrm>
+            <a:off x="7308200" y="3211509"/>
+            <a:ext cx="434402" cy="973085"/>
+          </a:xfrm>
+          <a:prstGeom prst="bentConnector3">
+            <a:avLst>
+              <a:gd name="adj1" fmla="val 50000"/>
+            </a:avLst>
+          </a:prstGeom>
+          <a:ln w="19050">
+            <a:solidFill>
+              <a:srgbClr val="7030A0"/>
+            </a:solidFill>
+            <a:headEnd type="none" w="med" len="med"/>
+            <a:tailEnd type="arrow" w="med" len="med"/>
+          </a:ln>
+          <a:effectLst/>
+        </p:spPr>
+        <p:style>
+          <a:lnRef idx="1">
+            <a:schemeClr val="accent2"/>
+          </a:lnRef>
+          <a:fillRef idx="2">
+            <a:schemeClr val="accent2"/>
+          </a:fillRef>
+          <a:effectRef idx="1">
+            <a:schemeClr val="accent2"/>
+          </a:effectRef>
+          <a:fontRef idx="minor">
+            <a:schemeClr val="dk1"/>
+          </a:fontRef>
+        </p:style>
+      </p:cxnSp>
+      <p:sp>
+        <p:nvSpPr>
+          <p:cNvPr id="77" name="TextBox 76">
+            <a:extLst>
+              <a:ext uri="{FF2B5EF4-FFF2-40B4-BE49-F238E27FC236}">
+                <a16:creationId xmlns:a16="http://schemas.microsoft.com/office/drawing/2014/main" id="{94D1BC70-8B3F-9740-ACAF-7F584B7FF5D6}"/>
+              </a:ext>
+            </a:extLst>
+          </p:cNvPr>
+          <p:cNvSpPr txBox="1"/>
+          <p:nvPr/>
+        </p:nvSpPr>
+        <p:spPr>
+          <a:xfrm>
+            <a:off x="7489110" y="4014387"/>
+            <a:ext cx="189257" cy="178683"/>
+          </a:xfrm>
+          <a:prstGeom prst="rect">
+            <a:avLst/>
+          </a:prstGeom>
+          <a:noFill/>
+        </p:spPr>
+        <p:txBody>
+          <a:bodyPr wrap="square" lIns="0" tIns="0" rIns="0" bIns="0" rtlCol="0">
+            <a:noAutofit/>
+          </a:bodyPr>
+          <a:lstStyle/>
+          <a:p>
+            <a:pPr algn="ctr"/>
+            <a:r>
+              <a:rPr lang="en-US" sz="800" dirty="0">
+                <a:solidFill>
+                  <a:srgbClr val="7030A0"/>
+                </a:solidFill>
+              </a:rPr>
+              <a:t>60</a:t>
+            </a:r>
+            <a:endParaRPr lang="en-SG" sz="1200" dirty="0">
+              <a:solidFill>
+                <a:srgbClr val="7030A0"/>
+              </a:solidFill>
+            </a:endParaRPr>
+          </a:p>
+        </p:txBody>
+      </p:sp>
+      <p:sp>
+        <p:nvSpPr>
+          <p:cNvPr id="82" name="Rectangle 8">
+            <a:extLst>
+              <a:ext uri="{FF2B5EF4-FFF2-40B4-BE49-F238E27FC236}">
+                <a16:creationId xmlns:a16="http://schemas.microsoft.com/office/drawing/2014/main" id="{B618E118-EDC8-9D42-9E06-25042EE41B83}"/>
+              </a:ext>
+            </a:extLst>
+          </p:cNvPr>
+          <p:cNvSpPr/>
+          <p:nvPr/>
+        </p:nvSpPr>
+        <p:spPr>
+          <a:xfrm>
+            <a:off x="1263304" y="1842388"/>
+            <a:ext cx="1745201" cy="364396"/>
+          </a:xfrm>
+          <a:prstGeom prst="rect">
+            <a:avLst/>
+          </a:prstGeom>
+          <a:ln w="19050">
+            <a:solidFill>
+              <a:srgbClr val="7030A0"/>
+            </a:solidFill>
+          </a:ln>
+          <a:effectLst/>
+        </p:spPr>
+        <p:style>
+          <a:lnRef idx="1">
+            <a:schemeClr val="accent4"/>
+          </a:lnRef>
+          <a:fillRef idx="2">
+            <a:schemeClr val="accent4"/>
+          </a:fillRef>
+          <a:effectRef idx="1">
+            <a:schemeClr val="accent4"/>
+          </a:effectRef>
+          <a:fontRef idx="minor">
+            <a:schemeClr val="dk1"/>
+          </a:fontRef>
+        </p:style>
+        <p:txBody>
+          <a:bodyPr rtlCol="0" anchor="ctr"/>
+          <a:lstStyle/>
+          <a:p>
+            <a:pPr algn="ctr"/>
+            <a:r>
+              <a:rPr lang="en-US" sz="1050" dirty="0">
+                <a:solidFill>
+                  <a:srgbClr val="7030A0"/>
+                </a:solidFill>
+              </a:rPr>
+              <a:t>&lt;&lt;interface&gt;&gt;</a:t>
+            </a:r>
+            <a:br>
+              <a:rPr lang="en-US" sz="1050" dirty="0">
+                <a:solidFill>
+                  <a:srgbClr val="7030A0"/>
+                </a:solidFill>
+              </a:rPr>
+            </a:br>
+            <a:r>
+              <a:rPr lang="en-US" sz="1050" dirty="0" err="1">
+                <a:solidFill>
+                  <a:srgbClr val="7030A0"/>
+                </a:solidFill>
+              </a:rPr>
+              <a:t>ReadOnlyNotesDownloaded</a:t>
+            </a:r>
+            <a:endParaRPr lang="en-SG" sz="1050" dirty="0">
+              <a:solidFill>
+                <a:srgbClr val="7030A0"/>
+              </a:solidFill>
+            </a:endParaRPr>
+          </a:p>
+        </p:txBody>
+      </p:sp>
+      <p:sp>
+        <p:nvSpPr>
+          <p:cNvPr id="88" name="Isosceles Triangle 102">
+            <a:extLst>
+              <a:ext uri="{FF2B5EF4-FFF2-40B4-BE49-F238E27FC236}">
+                <a16:creationId xmlns:a16="http://schemas.microsoft.com/office/drawing/2014/main" id="{600525CA-256A-E24F-80C8-9154FCFE58A2}"/>
+              </a:ext>
+            </a:extLst>
+          </p:cNvPr>
+          <p:cNvSpPr/>
+          <p:nvPr/>
+        </p:nvSpPr>
+        <p:spPr>
+          <a:xfrm rot="16200000">
+            <a:off x="2989791" y="1921500"/>
+            <a:ext cx="271014" cy="187417"/>
+          </a:xfrm>
+          <a:prstGeom prst="triangle">
+            <a:avLst>
+              <a:gd name="adj" fmla="val 44517"/>
+            </a:avLst>
+          </a:prstGeom>
+          <a:solidFill>
+            <a:schemeClr val="accent4">
+              <a:lumMod val="20000"/>
+              <a:lumOff val="80000"/>
+            </a:schemeClr>
+          </a:solidFill>
+          <a:ln w="19050">
+            <a:solidFill>
+              <a:srgbClr val="7030A0"/>
+            </a:solidFill>
+          </a:ln>
+          <a:effectLst/>
+        </p:spPr>
+        <p:style>
+          <a:lnRef idx="1">
+            <a:schemeClr val="accent6"/>
+          </a:lnRef>
+          <a:fillRef idx="2">
+            <a:schemeClr val="accent6"/>
+          </a:fillRef>
+          <a:effectRef idx="1">
+            <a:schemeClr val="accent6"/>
+          </a:effectRef>
+          <a:fontRef idx="minor">
+            <a:schemeClr val="dk1"/>
+          </a:fontRef>
+        </p:style>
+        <p:txBody>
+          <a:bodyPr rtlCol="0" anchor="ctr"/>
+          <a:lstStyle/>
+          <a:p>
+            <a:pPr algn="ctr"/>
+            <a:endParaRPr lang="en-SG" sz="1050"/>
+          </a:p>
+        </p:txBody>
+      </p:sp>
+      <p:cxnSp>
+        <p:nvCxnSpPr>
+          <p:cNvPr id="96" name="Straight Arrow Connector 95">
+            <a:extLst>
+              <a:ext uri="{FF2B5EF4-FFF2-40B4-BE49-F238E27FC236}">
+                <a16:creationId xmlns:a16="http://schemas.microsoft.com/office/drawing/2014/main" id="{6A1D61F5-78DD-3645-9738-75D28270651A}"/>
+              </a:ext>
+            </a:extLst>
+          </p:cNvPr>
+          <p:cNvCxnSpPr>
+            <a:stCxn id="97" idx="3"/>
+          </p:cNvCxnSpPr>
+          <p:nvPr/>
+        </p:nvCxnSpPr>
+        <p:spPr>
+          <a:xfrm flipV="1">
+            <a:off x="2629463" y="2845672"/>
+            <a:ext cx="201958" cy="3093"/>
+          </a:xfrm>
+          <a:prstGeom prst="straightConnector1">
+            <a:avLst/>
+          </a:prstGeom>
+          <a:ln w="19050">
+            <a:solidFill>
+              <a:srgbClr val="7030A0"/>
+            </a:solidFill>
+            <a:headEnd type="none" w="med" len="med"/>
+            <a:tailEnd type="arrow" w="med" len="med"/>
+          </a:ln>
+          <a:effectLst/>
+        </p:spPr>
+        <p:style>
+          <a:lnRef idx="1">
+            <a:schemeClr val="accent2"/>
+          </a:lnRef>
+          <a:fillRef idx="2">
+            <a:schemeClr val="accent2"/>
+          </a:fillRef>
+          <a:effectRef idx="1">
+            <a:schemeClr val="accent2"/>
+          </a:effectRef>
+          <a:fontRef idx="minor">
+            <a:schemeClr val="dk1"/>
+          </a:fontRef>
+        </p:style>
+      </p:cxnSp>
+      <p:sp>
+        <p:nvSpPr>
+          <p:cNvPr id="97" name="Flowchart: Decision 96">
+            <a:extLst>
+              <a:ext uri="{FF2B5EF4-FFF2-40B4-BE49-F238E27FC236}">
+                <a16:creationId xmlns:a16="http://schemas.microsoft.com/office/drawing/2014/main" id="{940BCB17-776C-414B-9821-4E26A54BF1DE}"/>
+              </a:ext>
+            </a:extLst>
+          </p:cNvPr>
+          <p:cNvSpPr/>
+          <p:nvPr/>
+        </p:nvSpPr>
+        <p:spPr>
+          <a:xfrm>
+            <a:off x="2393415" y="2762075"/>
+            <a:ext cx="236048" cy="173380"/>
+          </a:xfrm>
+          <a:prstGeom prst="flowChartDecision">
+            <a:avLst/>
+          </a:prstGeom>
+          <a:noFill/>
+          <a:ln w="19050">
+            <a:solidFill>
+              <a:srgbClr val="7030A0"/>
+            </a:solidFill>
+          </a:ln>
+          <a:effectLst/>
+        </p:spPr>
+        <p:style>
+          <a:lnRef idx="1">
+            <a:schemeClr val="accent6"/>
+          </a:lnRef>
+          <a:fillRef idx="2">
+            <a:schemeClr val="accent6"/>
+          </a:fillRef>
+          <a:effectRef idx="1">
+            <a:schemeClr val="accent6"/>
+          </a:effectRef>
+          <a:fontRef idx="minor">
+            <a:schemeClr val="dk1"/>
+          </a:fontRef>
+        </p:style>
+        <p:txBody>
+          <a:bodyPr rtlCol="0" anchor="ctr"/>
+          <a:lstStyle/>
+          <a:p>
+            <a:pPr algn="ctr"/>
+            <a:endParaRPr lang="en-US" sz="1050"/>
+          </a:p>
+        </p:txBody>
+      </p:sp>
+      <p:sp>
+        <p:nvSpPr>
+          <p:cNvPr id="98" name="Rectangle 8">
+            <a:extLst>
+              <a:ext uri="{FF2B5EF4-FFF2-40B4-BE49-F238E27FC236}">
+                <a16:creationId xmlns:a16="http://schemas.microsoft.com/office/drawing/2014/main" id="{72ABAB15-D277-C347-B691-E79FC9E0C265}"/>
+              </a:ext>
+            </a:extLst>
+          </p:cNvPr>
+          <p:cNvSpPr/>
+          <p:nvPr/>
+        </p:nvSpPr>
+        <p:spPr>
+          <a:xfrm>
+            <a:off x="2831421" y="2634990"/>
+            <a:ext cx="1246470" cy="346760"/>
+          </a:xfrm>
+          <a:prstGeom prst="rect">
+            <a:avLst/>
+          </a:prstGeom>
+          <a:ln w="19050">
+            <a:solidFill>
+              <a:srgbClr val="7030A0"/>
+            </a:solidFill>
+          </a:ln>
+          <a:effectLst/>
+        </p:spPr>
+        <p:style>
+          <a:lnRef idx="1">
+            <a:schemeClr val="accent4"/>
+          </a:lnRef>
+          <a:fillRef idx="2">
+            <a:schemeClr val="accent4"/>
+          </a:fillRef>
+          <a:effectRef idx="1">
+            <a:schemeClr val="accent4"/>
+          </a:effectRef>
+          <a:fontRef idx="minor">
+            <a:schemeClr val="dk1"/>
+          </a:fontRef>
+        </p:style>
+        <p:txBody>
+          <a:bodyPr rtlCol="0" anchor="ctr"/>
+          <a:lstStyle/>
+          <a:p>
+            <a:pPr algn="ctr"/>
+            <a:r>
+              <a:rPr lang="en-US" sz="1050" dirty="0" err="1">
+                <a:solidFill>
+                  <a:srgbClr val="7030A0"/>
+                </a:solidFill>
+              </a:rPr>
+              <a:t>NotesDownloaded</a:t>
+            </a:r>
+            <a:endParaRPr lang="en-SG" sz="1050" dirty="0">
+              <a:solidFill>
+                <a:srgbClr val="7030A0"/>
+              </a:solidFill>
+            </a:endParaRPr>
+          </a:p>
+        </p:txBody>
+      </p:sp>
+      <p:cxnSp>
+        <p:nvCxnSpPr>
+          <p:cNvPr id="99" name="Elbow Connector 63">
+            <a:extLst>
+              <a:ext uri="{FF2B5EF4-FFF2-40B4-BE49-F238E27FC236}">
+                <a16:creationId xmlns:a16="http://schemas.microsoft.com/office/drawing/2014/main" id="{9F84505E-D1FB-8E43-A093-9DE57B0D67C2}"/>
+              </a:ext>
+            </a:extLst>
+          </p:cNvPr>
+          <p:cNvCxnSpPr>
+            <a:cxnSpLocks/>
+            <a:stCxn id="88" idx="3"/>
+          </p:cNvCxnSpPr>
+          <p:nvPr/>
+        </p:nvCxnSpPr>
+        <p:spPr>
+          <a:xfrm>
+            <a:off x="3219007" y="2030069"/>
+            <a:ext cx="492962" cy="598968"/>
+          </a:xfrm>
+          <a:prstGeom prst="bentConnector2">
+            <a:avLst/>
+          </a:prstGeom>
+          <a:ln w="19050">
+            <a:solidFill>
+              <a:srgbClr val="7030A0"/>
+            </a:solidFill>
+            <a:prstDash val="sysDot"/>
+            <a:headEnd type="none" w="med" len="med"/>
+            <a:tailEnd type="none" w="med" len="med"/>
+          </a:ln>
+          <a:effectLst/>
+        </p:spPr>
+        <p:style>
+          <a:lnRef idx="1">
+            <a:schemeClr val="accent2"/>
+          </a:lnRef>
+          <a:fillRef idx="2">
+            <a:schemeClr val="accent2"/>
+          </a:fillRef>
+          <a:effectRef idx="1">
+            <a:schemeClr val="accent2"/>
+          </a:effectRef>
+          <a:fontRef idx="minor">
+            <a:schemeClr val="dk1"/>
+          </a:fontRef>
+        </p:style>
+      </p:cxnSp>
+      <p:sp>
+        <p:nvSpPr>
+          <p:cNvPr id="101" name="TextBox 100">
+            <a:extLst>
+              <a:ext uri="{FF2B5EF4-FFF2-40B4-BE49-F238E27FC236}">
+                <a16:creationId xmlns:a16="http://schemas.microsoft.com/office/drawing/2014/main" id="{EF8784EB-2F63-0349-9EC3-09FB1967D7B2}"/>
+              </a:ext>
+            </a:extLst>
+          </p:cNvPr>
+          <p:cNvSpPr txBox="1"/>
+          <p:nvPr/>
+        </p:nvSpPr>
+        <p:spPr>
+          <a:xfrm>
+            <a:off x="2741352" y="2858789"/>
+            <a:ext cx="78378" cy="193767"/>
+          </a:xfrm>
+          <a:prstGeom prst="rect">
+            <a:avLst/>
+          </a:prstGeom>
+          <a:noFill/>
+        </p:spPr>
+        <p:txBody>
+          <a:bodyPr wrap="square" lIns="0" tIns="0" rIns="0" bIns="0" rtlCol="0">
+            <a:noAutofit/>
+          </a:bodyPr>
+          <a:lstStyle/>
+          <a:p>
+            <a:pPr algn="ctr"/>
+            <a:r>
+              <a:rPr lang="en-US" sz="1100" dirty="0">
+                <a:solidFill>
+                  <a:srgbClr val="7030A0"/>
+                </a:solidFill>
+              </a:rPr>
+              <a:t>1</a:t>
             </a:r>
             <a:endParaRPr lang="en-SG" sz="1100" dirty="0">
               <a:solidFill>

</xml_diff>